<commit_message>
Dan wrote a findPerpendicularWall as well
</commit_message>
<xml_diff>
--- a/others/Bumper sticker.pptx
+++ b/others/Bumper sticker.pptx
@@ -7,14 +7,14 @@
   <p:sldIdLst>
     <p:sldId id="256" r:id="rId2"/>
   </p:sldIdLst>
-  <p:sldSz cx="5400675" cy="2520950"/>
+  <p:sldSz cx="6858000" cy="9906000" type="A4"/>
   <p:notesSz cx="6858000" cy="9144000"/>
   <p:defaultTextStyle>
     <a:defPPr>
       <a:defRPr lang="en-US"/>
     </a:defPPr>
-    <a:lvl1pPr marL="0" algn="l" defTabSz="452628" rtl="0" eaLnBrk="1" latinLnBrk="0" hangingPunct="1">
-      <a:defRPr sz="900" kern="1200">
+    <a:lvl1pPr marL="0" algn="l" defTabSz="957851" rtl="0" eaLnBrk="1" latinLnBrk="0" hangingPunct="1">
+      <a:defRPr sz="1900" kern="1200">
         <a:solidFill>
           <a:schemeClr val="tx1"/>
         </a:solidFill>
@@ -23,8 +23,8 @@
         <a:cs typeface="+mn-cs"/>
       </a:defRPr>
     </a:lvl1pPr>
-    <a:lvl2pPr marL="226314" algn="l" defTabSz="452628" rtl="0" eaLnBrk="1" latinLnBrk="0" hangingPunct="1">
-      <a:defRPr sz="900" kern="1200">
+    <a:lvl2pPr marL="478926" algn="l" defTabSz="957851" rtl="0" eaLnBrk="1" latinLnBrk="0" hangingPunct="1">
+      <a:defRPr sz="1900" kern="1200">
         <a:solidFill>
           <a:schemeClr val="tx1"/>
         </a:solidFill>
@@ -33,8 +33,8 @@
         <a:cs typeface="+mn-cs"/>
       </a:defRPr>
     </a:lvl2pPr>
-    <a:lvl3pPr marL="452628" algn="l" defTabSz="452628" rtl="0" eaLnBrk="1" latinLnBrk="0" hangingPunct="1">
-      <a:defRPr sz="900" kern="1200">
+    <a:lvl3pPr marL="957851" algn="l" defTabSz="957851" rtl="0" eaLnBrk="1" latinLnBrk="0" hangingPunct="1">
+      <a:defRPr sz="1900" kern="1200">
         <a:solidFill>
           <a:schemeClr val="tx1"/>
         </a:solidFill>
@@ -43,8 +43,8 @@
         <a:cs typeface="+mn-cs"/>
       </a:defRPr>
     </a:lvl3pPr>
-    <a:lvl4pPr marL="678942" algn="l" defTabSz="452628" rtl="0" eaLnBrk="1" latinLnBrk="0" hangingPunct="1">
-      <a:defRPr sz="900" kern="1200">
+    <a:lvl4pPr marL="1436777" algn="l" defTabSz="957851" rtl="0" eaLnBrk="1" latinLnBrk="0" hangingPunct="1">
+      <a:defRPr sz="1900" kern="1200">
         <a:solidFill>
           <a:schemeClr val="tx1"/>
         </a:solidFill>
@@ -53,8 +53,8 @@
         <a:cs typeface="+mn-cs"/>
       </a:defRPr>
     </a:lvl4pPr>
-    <a:lvl5pPr marL="905256" algn="l" defTabSz="452628" rtl="0" eaLnBrk="1" latinLnBrk="0" hangingPunct="1">
-      <a:defRPr sz="900" kern="1200">
+    <a:lvl5pPr marL="1915703" algn="l" defTabSz="957851" rtl="0" eaLnBrk="1" latinLnBrk="0" hangingPunct="1">
+      <a:defRPr sz="1900" kern="1200">
         <a:solidFill>
           <a:schemeClr val="tx1"/>
         </a:solidFill>
@@ -63,8 +63,8 @@
         <a:cs typeface="+mn-cs"/>
       </a:defRPr>
     </a:lvl5pPr>
-    <a:lvl6pPr marL="1131570" algn="l" defTabSz="452628" rtl="0" eaLnBrk="1" latinLnBrk="0" hangingPunct="1">
-      <a:defRPr sz="900" kern="1200">
+    <a:lvl6pPr marL="2394628" algn="l" defTabSz="957851" rtl="0" eaLnBrk="1" latinLnBrk="0" hangingPunct="1">
+      <a:defRPr sz="1900" kern="1200">
         <a:solidFill>
           <a:schemeClr val="tx1"/>
         </a:solidFill>
@@ -73,8 +73,8 @@
         <a:cs typeface="+mn-cs"/>
       </a:defRPr>
     </a:lvl6pPr>
-    <a:lvl7pPr marL="1357884" algn="l" defTabSz="452628" rtl="0" eaLnBrk="1" latinLnBrk="0" hangingPunct="1">
-      <a:defRPr sz="900" kern="1200">
+    <a:lvl7pPr marL="2873554" algn="l" defTabSz="957851" rtl="0" eaLnBrk="1" latinLnBrk="0" hangingPunct="1">
+      <a:defRPr sz="1900" kern="1200">
         <a:solidFill>
           <a:schemeClr val="tx1"/>
         </a:solidFill>
@@ -83,8 +83,8 @@
         <a:cs typeface="+mn-cs"/>
       </a:defRPr>
     </a:lvl7pPr>
-    <a:lvl8pPr marL="1584198" algn="l" defTabSz="452628" rtl="0" eaLnBrk="1" latinLnBrk="0" hangingPunct="1">
-      <a:defRPr sz="900" kern="1200">
+    <a:lvl8pPr marL="3352480" algn="l" defTabSz="957851" rtl="0" eaLnBrk="1" latinLnBrk="0" hangingPunct="1">
+      <a:defRPr sz="1900" kern="1200">
         <a:solidFill>
           <a:schemeClr val="tx1"/>
         </a:solidFill>
@@ -93,8 +93,8 @@
         <a:cs typeface="+mn-cs"/>
       </a:defRPr>
     </a:lvl8pPr>
-    <a:lvl9pPr marL="1810512" algn="l" defTabSz="452628" rtl="0" eaLnBrk="1" latinLnBrk="0" hangingPunct="1">
-      <a:defRPr sz="900" kern="1200">
+    <a:lvl9pPr marL="3831405" algn="l" defTabSz="957851" rtl="0" eaLnBrk="1" latinLnBrk="0" hangingPunct="1">
+      <a:defRPr sz="1900" kern="1200">
         <a:solidFill>
           <a:schemeClr val="tx1"/>
         </a:solidFill>
@@ -136,8 +136,8 @@
         </p:nvSpPr>
         <p:spPr>
           <a:xfrm>
-            <a:off x="405051" y="783129"/>
-            <a:ext cx="4590574" cy="540370"/>
+            <a:off x="514351" y="3077283"/>
+            <a:ext cx="5829300" cy="2123368"/>
           </a:xfrm>
         </p:spPr>
         <p:txBody>
@@ -164,8 +164,8 @@
         </p:nvSpPr>
         <p:spPr>
           <a:xfrm>
-            <a:off x="810101" y="1428538"/>
-            <a:ext cx="3780473" cy="644243"/>
+            <a:off x="1028700" y="5613401"/>
+            <a:ext cx="4800601" cy="2531534"/>
           </a:xfrm>
         </p:spPr>
         <p:txBody>
@@ -181,7 +181,7 @@
                 </a:solidFill>
               </a:defRPr>
             </a:lvl1pPr>
-            <a:lvl2pPr marL="226314" indent="0" algn="ctr">
+            <a:lvl2pPr marL="478926" indent="0" algn="ctr">
               <a:buNone/>
               <a:defRPr>
                 <a:solidFill>
@@ -191,7 +191,7 @@
                 </a:solidFill>
               </a:defRPr>
             </a:lvl2pPr>
-            <a:lvl3pPr marL="452628" indent="0" algn="ctr">
+            <a:lvl3pPr marL="957851" indent="0" algn="ctr">
               <a:buNone/>
               <a:defRPr>
                 <a:solidFill>
@@ -201,7 +201,7 @@
                 </a:solidFill>
               </a:defRPr>
             </a:lvl3pPr>
-            <a:lvl4pPr marL="678942" indent="0" algn="ctr">
+            <a:lvl4pPr marL="1436777" indent="0" algn="ctr">
               <a:buNone/>
               <a:defRPr>
                 <a:solidFill>
@@ -211,7 +211,7 @@
                 </a:solidFill>
               </a:defRPr>
             </a:lvl4pPr>
-            <a:lvl5pPr marL="905256" indent="0" algn="ctr">
+            <a:lvl5pPr marL="1915703" indent="0" algn="ctr">
               <a:buNone/>
               <a:defRPr>
                 <a:solidFill>
@@ -221,7 +221,7 @@
                 </a:solidFill>
               </a:defRPr>
             </a:lvl5pPr>
-            <a:lvl6pPr marL="1131570" indent="0" algn="ctr">
+            <a:lvl6pPr marL="2394628" indent="0" algn="ctr">
               <a:buNone/>
               <a:defRPr>
                 <a:solidFill>
@@ -231,7 +231,7 @@
                 </a:solidFill>
               </a:defRPr>
             </a:lvl6pPr>
-            <a:lvl7pPr marL="1357884" indent="0" algn="ctr">
+            <a:lvl7pPr marL="2873554" indent="0" algn="ctr">
               <a:buNone/>
               <a:defRPr>
                 <a:solidFill>
@@ -241,7 +241,7 @@
                 </a:solidFill>
               </a:defRPr>
             </a:lvl7pPr>
-            <a:lvl8pPr marL="1584198" indent="0" algn="ctr">
+            <a:lvl8pPr marL="3352480" indent="0" algn="ctr">
               <a:buNone/>
               <a:defRPr>
                 <a:solidFill>
@@ -251,7 +251,7 @@
                 </a:solidFill>
               </a:defRPr>
             </a:lvl8pPr>
-            <a:lvl9pPr marL="1810512" indent="0" algn="ctr">
+            <a:lvl9pPr marL="3831405" indent="0" algn="ctr">
               <a:buNone/>
               <a:defRPr>
                 <a:solidFill>
@@ -288,7 +288,7 @@
           <a:p>
             <a:fld id="{CA8354C6-666D-416A-8003-CE414C96EEF9}" type="datetimeFigureOut">
               <a:rPr lang="en-GB" smtClean="0"/>
-              <a:t>08/02/2014</a:t>
+              <a:t>12/02/2014</a:t>
             </a:fld>
             <a:endParaRPr lang="en-GB"/>
           </a:p>
@@ -458,7 +458,7 @@
           <a:p>
             <a:fld id="{CA8354C6-666D-416A-8003-CE414C96EEF9}" type="datetimeFigureOut">
               <a:rPr lang="en-GB" smtClean="0"/>
-              <a:t>08/02/2014</a:t>
+              <a:t>12/02/2014</a:t>
             </a:fld>
             <a:endParaRPr lang="en-GB"/>
           </a:p>
@@ -548,8 +548,8 @@
         </p:nvSpPr>
         <p:spPr>
           <a:xfrm>
-            <a:off x="2313102" y="37348"/>
-            <a:ext cx="717277" cy="790715"/>
+            <a:off x="2937273" y="146760"/>
+            <a:ext cx="910828" cy="3107092"/>
           </a:xfrm>
         </p:spPr>
         <p:txBody>
@@ -576,8 +576,8 @@
         </p:nvSpPr>
         <p:spPr>
           <a:xfrm>
-            <a:off x="159395" y="37348"/>
-            <a:ext cx="2063696" cy="790715"/>
+            <a:off x="202407" y="146760"/>
+            <a:ext cx="2620566" cy="3107092"/>
           </a:xfrm>
         </p:spPr>
         <p:txBody>
@@ -638,7 +638,7 @@
           <a:p>
             <a:fld id="{CA8354C6-666D-416A-8003-CE414C96EEF9}" type="datetimeFigureOut">
               <a:rPr lang="en-GB" smtClean="0"/>
-              <a:t>08/02/2014</a:t>
+              <a:t>12/02/2014</a:t>
             </a:fld>
             <a:endParaRPr lang="en-GB"/>
           </a:p>
@@ -808,7 +808,7 @@
           <a:p>
             <a:fld id="{CA8354C6-666D-416A-8003-CE414C96EEF9}" type="datetimeFigureOut">
               <a:rPr lang="en-GB" smtClean="0"/>
-              <a:t>08/02/2014</a:t>
+              <a:t>12/02/2014</a:t>
             </a:fld>
             <a:endParaRPr lang="en-GB"/>
           </a:p>
@@ -898,15 +898,15 @@
         </p:nvSpPr>
         <p:spPr>
           <a:xfrm>
-            <a:off x="426616" y="1619944"/>
-            <a:ext cx="4590574" cy="500689"/>
+            <a:off x="541735" y="6365525"/>
+            <a:ext cx="5829300" cy="1967443"/>
           </a:xfrm>
         </p:spPr>
         <p:txBody>
           <a:bodyPr anchor="t"/>
           <a:lstStyle>
             <a:lvl1pPr algn="l">
-              <a:defRPr sz="2000" b="1" cap="all"/>
+              <a:defRPr sz="4200" b="1" cap="all"/>
             </a:lvl1pPr>
           </a:lstStyle>
           <a:p>
@@ -930,8 +930,8 @@
         </p:nvSpPr>
         <p:spPr>
           <a:xfrm>
-            <a:off x="426616" y="1068486"/>
-            <a:ext cx="4590574" cy="551458"/>
+            <a:off x="541735" y="4198585"/>
+            <a:ext cx="5829300" cy="2166938"/>
           </a:xfrm>
         </p:spPr>
         <p:txBody>
@@ -939,7 +939,7 @@
           <a:lstStyle>
             <a:lvl1pPr marL="0" indent="0">
               <a:buNone/>
-              <a:defRPr sz="1000">
+              <a:defRPr sz="2100">
                 <a:solidFill>
                   <a:schemeClr val="tx1">
                     <a:tint val="75000"/>
@@ -947,9 +947,9 @@
                 </a:solidFill>
               </a:defRPr>
             </a:lvl1pPr>
-            <a:lvl2pPr marL="226314" indent="0">
-              <a:buNone/>
-              <a:defRPr sz="900">
+            <a:lvl2pPr marL="478926" indent="0">
+              <a:buNone/>
+              <a:defRPr sz="1900">
                 <a:solidFill>
                   <a:schemeClr val="tx1">
                     <a:tint val="75000"/>
@@ -957,9 +957,9 @@
                 </a:solidFill>
               </a:defRPr>
             </a:lvl2pPr>
-            <a:lvl3pPr marL="452628" indent="0">
-              <a:buNone/>
-              <a:defRPr sz="800">
+            <a:lvl3pPr marL="957851" indent="0">
+              <a:buNone/>
+              <a:defRPr sz="1700">
                 <a:solidFill>
                   <a:schemeClr val="tx1">
                     <a:tint val="75000"/>
@@ -967,9 +967,9 @@
                 </a:solidFill>
               </a:defRPr>
             </a:lvl3pPr>
-            <a:lvl4pPr marL="678942" indent="0">
-              <a:buNone/>
-              <a:defRPr sz="700">
+            <a:lvl4pPr marL="1436777" indent="0">
+              <a:buNone/>
+              <a:defRPr sz="1500">
                 <a:solidFill>
                   <a:schemeClr val="tx1">
                     <a:tint val="75000"/>
@@ -977,9 +977,9 @@
                 </a:solidFill>
               </a:defRPr>
             </a:lvl4pPr>
-            <a:lvl5pPr marL="905256" indent="0">
-              <a:buNone/>
-              <a:defRPr sz="700">
+            <a:lvl5pPr marL="1915703" indent="0">
+              <a:buNone/>
+              <a:defRPr sz="1500">
                 <a:solidFill>
                   <a:schemeClr val="tx1">
                     <a:tint val="75000"/>
@@ -987,9 +987,9 @@
                 </a:solidFill>
               </a:defRPr>
             </a:lvl5pPr>
-            <a:lvl6pPr marL="1131570" indent="0">
-              <a:buNone/>
-              <a:defRPr sz="700">
+            <a:lvl6pPr marL="2394628" indent="0">
+              <a:buNone/>
+              <a:defRPr sz="1500">
                 <a:solidFill>
                   <a:schemeClr val="tx1">
                     <a:tint val="75000"/>
@@ -997,9 +997,9 @@
                 </a:solidFill>
               </a:defRPr>
             </a:lvl6pPr>
-            <a:lvl7pPr marL="1357884" indent="0">
-              <a:buNone/>
-              <a:defRPr sz="700">
+            <a:lvl7pPr marL="2873554" indent="0">
+              <a:buNone/>
+              <a:defRPr sz="1500">
                 <a:solidFill>
                   <a:schemeClr val="tx1">
                     <a:tint val="75000"/>
@@ -1007,9 +1007,9 @@
                 </a:solidFill>
               </a:defRPr>
             </a:lvl7pPr>
-            <a:lvl8pPr marL="1584198" indent="0">
-              <a:buNone/>
-              <a:defRPr sz="700">
+            <a:lvl8pPr marL="3352480" indent="0">
+              <a:buNone/>
+              <a:defRPr sz="1500">
                 <a:solidFill>
                   <a:schemeClr val="tx1">
                     <a:tint val="75000"/>
@@ -1017,9 +1017,9 @@
                 </a:solidFill>
               </a:defRPr>
             </a:lvl8pPr>
-            <a:lvl9pPr marL="1810512" indent="0">
-              <a:buNone/>
-              <a:defRPr sz="700">
+            <a:lvl9pPr marL="3831405" indent="0">
+              <a:buNone/>
+              <a:defRPr sz="1500">
                 <a:solidFill>
                   <a:schemeClr val="tx1">
                     <a:tint val="75000"/>
@@ -1054,7 +1054,7 @@
           <a:p>
             <a:fld id="{CA8354C6-666D-416A-8003-CE414C96EEF9}" type="datetimeFigureOut">
               <a:rPr lang="en-GB" smtClean="0"/>
-              <a:t>08/02/2014</a:t>
+              <a:t>12/02/2014</a:t>
             </a:fld>
             <a:endParaRPr lang="en-GB"/>
           </a:p>
@@ -1167,39 +1167,39 @@
         </p:nvSpPr>
         <p:spPr>
           <a:xfrm>
-            <a:off x="159395" y="216498"/>
-            <a:ext cx="1390487" cy="611564"/>
+            <a:off x="202407" y="850723"/>
+            <a:ext cx="1765698" cy="2403123"/>
           </a:xfrm>
         </p:spPr>
         <p:txBody>
           <a:bodyPr/>
           <a:lstStyle>
             <a:lvl1pPr>
-              <a:defRPr sz="1400"/>
+              <a:defRPr sz="3000"/>
             </a:lvl1pPr>
             <a:lvl2pPr>
-              <a:defRPr sz="1200"/>
+              <a:defRPr sz="2500"/>
             </a:lvl2pPr>
             <a:lvl3pPr>
-              <a:defRPr sz="1000"/>
+              <a:defRPr sz="2100"/>
             </a:lvl3pPr>
             <a:lvl4pPr>
-              <a:defRPr sz="900"/>
+              <a:defRPr sz="1900"/>
             </a:lvl4pPr>
             <a:lvl5pPr>
-              <a:defRPr sz="900"/>
+              <a:defRPr sz="1900"/>
             </a:lvl5pPr>
             <a:lvl6pPr>
-              <a:defRPr sz="900"/>
+              <a:defRPr sz="1900"/>
             </a:lvl6pPr>
             <a:lvl7pPr>
-              <a:defRPr sz="900"/>
+              <a:defRPr sz="1900"/>
             </a:lvl7pPr>
             <a:lvl8pPr>
-              <a:defRPr sz="900"/>
+              <a:defRPr sz="1900"/>
             </a:lvl8pPr>
             <a:lvl9pPr>
-              <a:defRPr sz="900"/>
+              <a:defRPr sz="1900"/>
             </a:lvl9pPr>
           </a:lstStyle>
           <a:p>
@@ -1252,39 +1252,39 @@
         </p:nvSpPr>
         <p:spPr>
           <a:xfrm>
-            <a:off x="1639893" y="216498"/>
-            <a:ext cx="1390486" cy="611564"/>
+            <a:off x="2082404" y="850723"/>
+            <a:ext cx="1765697" cy="2403123"/>
           </a:xfrm>
         </p:spPr>
         <p:txBody>
           <a:bodyPr/>
           <a:lstStyle>
             <a:lvl1pPr>
-              <a:defRPr sz="1400"/>
+              <a:defRPr sz="3000"/>
             </a:lvl1pPr>
             <a:lvl2pPr>
-              <a:defRPr sz="1200"/>
+              <a:defRPr sz="2500"/>
             </a:lvl2pPr>
             <a:lvl3pPr>
-              <a:defRPr sz="1000"/>
+              <a:defRPr sz="2100"/>
             </a:lvl3pPr>
             <a:lvl4pPr>
-              <a:defRPr sz="900"/>
+              <a:defRPr sz="1900"/>
             </a:lvl4pPr>
             <a:lvl5pPr>
-              <a:defRPr sz="900"/>
+              <a:defRPr sz="1900"/>
             </a:lvl5pPr>
             <a:lvl6pPr>
-              <a:defRPr sz="900"/>
+              <a:defRPr sz="1900"/>
             </a:lvl6pPr>
             <a:lvl7pPr>
-              <a:defRPr sz="900"/>
+              <a:defRPr sz="1900"/>
             </a:lvl7pPr>
             <a:lvl8pPr>
-              <a:defRPr sz="900"/>
+              <a:defRPr sz="1900"/>
             </a:lvl8pPr>
             <a:lvl9pPr>
-              <a:defRPr sz="900"/>
+              <a:defRPr sz="1900"/>
             </a:lvl9pPr>
           </a:lstStyle>
           <a:p>
@@ -1342,7 +1342,7 @@
           <a:p>
             <a:fld id="{CA8354C6-666D-416A-8003-CE414C96EEF9}" type="datetimeFigureOut">
               <a:rPr lang="en-GB" smtClean="0"/>
-              <a:t>08/02/2014</a:t>
+              <a:t>12/02/2014</a:t>
             </a:fld>
             <a:endParaRPr lang="en-GB"/>
           </a:p>
@@ -1432,8 +1432,8 @@
         </p:nvSpPr>
         <p:spPr>
           <a:xfrm>
-            <a:off x="270034" y="100955"/>
-            <a:ext cx="4860608" cy="420158"/>
+            <a:off x="342900" y="396700"/>
+            <a:ext cx="6172201" cy="1650999"/>
           </a:xfrm>
         </p:spPr>
         <p:txBody>
@@ -1464,8 +1464,8 @@
         </p:nvSpPr>
         <p:spPr>
           <a:xfrm>
-            <a:off x="270034" y="564296"/>
-            <a:ext cx="2386236" cy="235172"/>
+            <a:off x="342900" y="2217385"/>
+            <a:ext cx="3030141" cy="924102"/>
           </a:xfrm>
         </p:spPr>
         <p:txBody>
@@ -1473,39 +1473,39 @@
           <a:lstStyle>
             <a:lvl1pPr marL="0" indent="0">
               <a:buNone/>
-              <a:defRPr sz="1200" b="1"/>
+              <a:defRPr sz="2500" b="1"/>
             </a:lvl1pPr>
-            <a:lvl2pPr marL="226314" indent="0">
-              <a:buNone/>
-              <a:defRPr sz="1000" b="1"/>
+            <a:lvl2pPr marL="478926" indent="0">
+              <a:buNone/>
+              <a:defRPr sz="2100" b="1"/>
             </a:lvl2pPr>
-            <a:lvl3pPr marL="452628" indent="0">
-              <a:buNone/>
-              <a:defRPr sz="900" b="1"/>
+            <a:lvl3pPr marL="957851" indent="0">
+              <a:buNone/>
+              <a:defRPr sz="1900" b="1"/>
             </a:lvl3pPr>
-            <a:lvl4pPr marL="678942" indent="0">
-              <a:buNone/>
-              <a:defRPr sz="800" b="1"/>
+            <a:lvl4pPr marL="1436777" indent="0">
+              <a:buNone/>
+              <a:defRPr sz="1700" b="1"/>
             </a:lvl4pPr>
-            <a:lvl5pPr marL="905256" indent="0">
-              <a:buNone/>
-              <a:defRPr sz="800" b="1"/>
+            <a:lvl5pPr marL="1915703" indent="0">
+              <a:buNone/>
+              <a:defRPr sz="1700" b="1"/>
             </a:lvl5pPr>
-            <a:lvl6pPr marL="1131570" indent="0">
-              <a:buNone/>
-              <a:defRPr sz="800" b="1"/>
+            <a:lvl6pPr marL="2394628" indent="0">
+              <a:buNone/>
+              <a:defRPr sz="1700" b="1"/>
             </a:lvl6pPr>
-            <a:lvl7pPr marL="1357884" indent="0">
-              <a:buNone/>
-              <a:defRPr sz="800" b="1"/>
+            <a:lvl7pPr marL="2873554" indent="0">
+              <a:buNone/>
+              <a:defRPr sz="1700" b="1"/>
             </a:lvl7pPr>
-            <a:lvl8pPr marL="1584198" indent="0">
-              <a:buNone/>
-              <a:defRPr sz="800" b="1"/>
+            <a:lvl8pPr marL="3352480" indent="0">
+              <a:buNone/>
+              <a:defRPr sz="1700" b="1"/>
             </a:lvl8pPr>
-            <a:lvl9pPr marL="1810512" indent="0">
-              <a:buNone/>
-              <a:defRPr sz="800" b="1"/>
+            <a:lvl9pPr marL="3831405" indent="0">
+              <a:buNone/>
+              <a:defRPr sz="1700" b="1"/>
             </a:lvl9pPr>
           </a:lstStyle>
           <a:p>
@@ -1529,39 +1529,39 @@
         </p:nvSpPr>
         <p:spPr>
           <a:xfrm>
-            <a:off x="270034" y="799468"/>
-            <a:ext cx="2386236" cy="1452464"/>
+            <a:off x="342900" y="3141486"/>
+            <a:ext cx="3030141" cy="5707415"/>
           </a:xfrm>
         </p:spPr>
         <p:txBody>
           <a:bodyPr/>
           <a:lstStyle>
             <a:lvl1pPr>
-              <a:defRPr sz="1200"/>
+              <a:defRPr sz="2500"/>
             </a:lvl1pPr>
             <a:lvl2pPr>
-              <a:defRPr sz="1000"/>
+              <a:defRPr sz="2100"/>
             </a:lvl2pPr>
             <a:lvl3pPr>
-              <a:defRPr sz="900"/>
+              <a:defRPr sz="1900"/>
             </a:lvl3pPr>
             <a:lvl4pPr>
-              <a:defRPr sz="800"/>
+              <a:defRPr sz="1700"/>
             </a:lvl4pPr>
             <a:lvl5pPr>
-              <a:defRPr sz="800"/>
+              <a:defRPr sz="1700"/>
             </a:lvl5pPr>
             <a:lvl6pPr>
-              <a:defRPr sz="800"/>
+              <a:defRPr sz="1700"/>
             </a:lvl6pPr>
             <a:lvl7pPr>
-              <a:defRPr sz="800"/>
+              <a:defRPr sz="1700"/>
             </a:lvl7pPr>
             <a:lvl8pPr>
-              <a:defRPr sz="800"/>
+              <a:defRPr sz="1700"/>
             </a:lvl8pPr>
             <a:lvl9pPr>
-              <a:defRPr sz="800"/>
+              <a:defRPr sz="1700"/>
             </a:lvl9pPr>
           </a:lstStyle>
           <a:p>
@@ -1614,8 +1614,8 @@
         </p:nvSpPr>
         <p:spPr>
           <a:xfrm>
-            <a:off x="2743468" y="564296"/>
-            <a:ext cx="2387173" cy="235172"/>
+            <a:off x="3483769" y="2217385"/>
+            <a:ext cx="3031331" cy="924102"/>
           </a:xfrm>
         </p:spPr>
         <p:txBody>
@@ -1623,39 +1623,39 @@
           <a:lstStyle>
             <a:lvl1pPr marL="0" indent="0">
               <a:buNone/>
-              <a:defRPr sz="1200" b="1"/>
+              <a:defRPr sz="2500" b="1"/>
             </a:lvl1pPr>
-            <a:lvl2pPr marL="226314" indent="0">
-              <a:buNone/>
-              <a:defRPr sz="1000" b="1"/>
+            <a:lvl2pPr marL="478926" indent="0">
+              <a:buNone/>
+              <a:defRPr sz="2100" b="1"/>
             </a:lvl2pPr>
-            <a:lvl3pPr marL="452628" indent="0">
-              <a:buNone/>
-              <a:defRPr sz="900" b="1"/>
+            <a:lvl3pPr marL="957851" indent="0">
+              <a:buNone/>
+              <a:defRPr sz="1900" b="1"/>
             </a:lvl3pPr>
-            <a:lvl4pPr marL="678942" indent="0">
-              <a:buNone/>
-              <a:defRPr sz="800" b="1"/>
+            <a:lvl4pPr marL="1436777" indent="0">
+              <a:buNone/>
+              <a:defRPr sz="1700" b="1"/>
             </a:lvl4pPr>
-            <a:lvl5pPr marL="905256" indent="0">
-              <a:buNone/>
-              <a:defRPr sz="800" b="1"/>
+            <a:lvl5pPr marL="1915703" indent="0">
+              <a:buNone/>
+              <a:defRPr sz="1700" b="1"/>
             </a:lvl5pPr>
-            <a:lvl6pPr marL="1131570" indent="0">
-              <a:buNone/>
-              <a:defRPr sz="800" b="1"/>
+            <a:lvl6pPr marL="2394628" indent="0">
+              <a:buNone/>
+              <a:defRPr sz="1700" b="1"/>
             </a:lvl6pPr>
-            <a:lvl7pPr marL="1357884" indent="0">
-              <a:buNone/>
-              <a:defRPr sz="800" b="1"/>
+            <a:lvl7pPr marL="2873554" indent="0">
+              <a:buNone/>
+              <a:defRPr sz="1700" b="1"/>
             </a:lvl7pPr>
-            <a:lvl8pPr marL="1584198" indent="0">
-              <a:buNone/>
-              <a:defRPr sz="800" b="1"/>
+            <a:lvl8pPr marL="3352480" indent="0">
+              <a:buNone/>
+              <a:defRPr sz="1700" b="1"/>
             </a:lvl8pPr>
-            <a:lvl9pPr marL="1810512" indent="0">
-              <a:buNone/>
-              <a:defRPr sz="800" b="1"/>
+            <a:lvl9pPr marL="3831405" indent="0">
+              <a:buNone/>
+              <a:defRPr sz="1700" b="1"/>
             </a:lvl9pPr>
           </a:lstStyle>
           <a:p>
@@ -1679,39 +1679,39 @@
         </p:nvSpPr>
         <p:spPr>
           <a:xfrm>
-            <a:off x="2743468" y="799468"/>
-            <a:ext cx="2387173" cy="1452464"/>
+            <a:off x="3483769" y="3141486"/>
+            <a:ext cx="3031331" cy="5707415"/>
           </a:xfrm>
         </p:spPr>
         <p:txBody>
           <a:bodyPr/>
           <a:lstStyle>
             <a:lvl1pPr>
-              <a:defRPr sz="1200"/>
+              <a:defRPr sz="2500"/>
             </a:lvl1pPr>
             <a:lvl2pPr>
-              <a:defRPr sz="1000"/>
+              <a:defRPr sz="2100"/>
             </a:lvl2pPr>
             <a:lvl3pPr>
-              <a:defRPr sz="900"/>
+              <a:defRPr sz="1900"/>
             </a:lvl3pPr>
             <a:lvl4pPr>
-              <a:defRPr sz="800"/>
+              <a:defRPr sz="1700"/>
             </a:lvl4pPr>
             <a:lvl5pPr>
-              <a:defRPr sz="800"/>
+              <a:defRPr sz="1700"/>
             </a:lvl5pPr>
             <a:lvl6pPr>
-              <a:defRPr sz="800"/>
+              <a:defRPr sz="1700"/>
             </a:lvl6pPr>
             <a:lvl7pPr>
-              <a:defRPr sz="800"/>
+              <a:defRPr sz="1700"/>
             </a:lvl7pPr>
             <a:lvl8pPr>
-              <a:defRPr sz="800"/>
+              <a:defRPr sz="1700"/>
             </a:lvl8pPr>
             <a:lvl9pPr>
-              <a:defRPr sz="800"/>
+              <a:defRPr sz="1700"/>
             </a:lvl9pPr>
           </a:lstStyle>
           <a:p>
@@ -1769,7 +1769,7 @@
           <a:p>
             <a:fld id="{CA8354C6-666D-416A-8003-CE414C96EEF9}" type="datetimeFigureOut">
               <a:rPr lang="en-GB" smtClean="0"/>
-              <a:t>08/02/2014</a:t>
+              <a:t>12/02/2014</a:t>
             </a:fld>
             <a:endParaRPr lang="en-GB"/>
           </a:p>
@@ -1887,7 +1887,7 @@
           <a:p>
             <a:fld id="{CA8354C6-666D-416A-8003-CE414C96EEF9}" type="datetimeFigureOut">
               <a:rPr lang="en-GB" smtClean="0"/>
-              <a:t>08/02/2014</a:t>
+              <a:t>12/02/2014</a:t>
             </a:fld>
             <a:endParaRPr lang="en-GB"/>
           </a:p>
@@ -1982,7 +1982,7 @@
           <a:p>
             <a:fld id="{CA8354C6-666D-416A-8003-CE414C96EEF9}" type="datetimeFigureOut">
               <a:rPr lang="en-GB" smtClean="0"/>
-              <a:t>08/02/2014</a:t>
+              <a:t>12/02/2014</a:t>
             </a:fld>
             <a:endParaRPr lang="en-GB"/>
           </a:p>
@@ -2072,15 +2072,15 @@
         </p:nvSpPr>
         <p:spPr>
           <a:xfrm>
-            <a:off x="270034" y="100371"/>
-            <a:ext cx="1776785" cy="427161"/>
+            <a:off x="342901" y="394407"/>
+            <a:ext cx="2256235" cy="1678517"/>
           </a:xfrm>
         </p:spPr>
         <p:txBody>
           <a:bodyPr anchor="b"/>
           <a:lstStyle>
             <a:lvl1pPr algn="l">
-              <a:defRPr sz="1000" b="1"/>
+              <a:defRPr sz="2100" b="1"/>
             </a:lvl1pPr>
           </a:lstStyle>
           <a:p>
@@ -2104,39 +2104,39 @@
         </p:nvSpPr>
         <p:spPr>
           <a:xfrm>
-            <a:off x="2111514" y="100371"/>
-            <a:ext cx="3019127" cy="2151561"/>
+            <a:off x="2681288" y="394407"/>
+            <a:ext cx="3833812" cy="8454497"/>
           </a:xfrm>
         </p:spPr>
         <p:txBody>
           <a:bodyPr/>
           <a:lstStyle>
             <a:lvl1pPr>
-              <a:defRPr sz="1600"/>
+              <a:defRPr sz="3400"/>
             </a:lvl1pPr>
             <a:lvl2pPr>
-              <a:defRPr sz="1400"/>
+              <a:defRPr sz="3000"/>
             </a:lvl2pPr>
             <a:lvl3pPr>
-              <a:defRPr sz="1200"/>
+              <a:defRPr sz="2500"/>
             </a:lvl3pPr>
             <a:lvl4pPr>
-              <a:defRPr sz="1000"/>
+              <a:defRPr sz="2100"/>
             </a:lvl4pPr>
             <a:lvl5pPr>
-              <a:defRPr sz="1000"/>
+              <a:defRPr sz="2100"/>
             </a:lvl5pPr>
             <a:lvl6pPr>
-              <a:defRPr sz="1000"/>
+              <a:defRPr sz="2100"/>
             </a:lvl6pPr>
             <a:lvl7pPr>
-              <a:defRPr sz="1000"/>
+              <a:defRPr sz="2100"/>
             </a:lvl7pPr>
             <a:lvl8pPr>
-              <a:defRPr sz="1000"/>
+              <a:defRPr sz="2100"/>
             </a:lvl8pPr>
             <a:lvl9pPr>
-              <a:defRPr sz="1000"/>
+              <a:defRPr sz="2100"/>
             </a:lvl9pPr>
           </a:lstStyle>
           <a:p>
@@ -2189,8 +2189,8 @@
         </p:nvSpPr>
         <p:spPr>
           <a:xfrm>
-            <a:off x="270034" y="527532"/>
-            <a:ext cx="1776785" cy="1724400"/>
+            <a:off x="342901" y="2072922"/>
+            <a:ext cx="2256235" cy="6775980"/>
           </a:xfrm>
         </p:spPr>
         <p:txBody>
@@ -2198,39 +2198,39 @@
           <a:lstStyle>
             <a:lvl1pPr marL="0" indent="0">
               <a:buNone/>
-              <a:defRPr sz="700"/>
+              <a:defRPr sz="1500"/>
             </a:lvl1pPr>
-            <a:lvl2pPr marL="226314" indent="0">
-              <a:buNone/>
-              <a:defRPr sz="600"/>
+            <a:lvl2pPr marL="478926" indent="0">
+              <a:buNone/>
+              <a:defRPr sz="1300"/>
             </a:lvl2pPr>
-            <a:lvl3pPr marL="452628" indent="0">
-              <a:buNone/>
-              <a:defRPr sz="500"/>
+            <a:lvl3pPr marL="957851" indent="0">
+              <a:buNone/>
+              <a:defRPr sz="1100"/>
             </a:lvl3pPr>
-            <a:lvl4pPr marL="678942" indent="0">
-              <a:buNone/>
-              <a:defRPr sz="400"/>
+            <a:lvl4pPr marL="1436777" indent="0">
+              <a:buNone/>
+              <a:defRPr sz="800"/>
             </a:lvl4pPr>
-            <a:lvl5pPr marL="905256" indent="0">
-              <a:buNone/>
-              <a:defRPr sz="400"/>
+            <a:lvl5pPr marL="1915703" indent="0">
+              <a:buNone/>
+              <a:defRPr sz="800"/>
             </a:lvl5pPr>
-            <a:lvl6pPr marL="1131570" indent="0">
-              <a:buNone/>
-              <a:defRPr sz="400"/>
+            <a:lvl6pPr marL="2394628" indent="0">
+              <a:buNone/>
+              <a:defRPr sz="800"/>
             </a:lvl6pPr>
-            <a:lvl7pPr marL="1357884" indent="0">
-              <a:buNone/>
-              <a:defRPr sz="400"/>
+            <a:lvl7pPr marL="2873554" indent="0">
+              <a:buNone/>
+              <a:defRPr sz="800"/>
             </a:lvl7pPr>
-            <a:lvl8pPr marL="1584198" indent="0">
-              <a:buNone/>
-              <a:defRPr sz="400"/>
+            <a:lvl8pPr marL="3352480" indent="0">
+              <a:buNone/>
+              <a:defRPr sz="800"/>
             </a:lvl8pPr>
-            <a:lvl9pPr marL="1810512" indent="0">
-              <a:buNone/>
-              <a:defRPr sz="400"/>
+            <a:lvl9pPr marL="3831405" indent="0">
+              <a:buNone/>
+              <a:defRPr sz="800"/>
             </a:lvl9pPr>
           </a:lstStyle>
           <a:p>
@@ -2259,7 +2259,7 @@
           <a:p>
             <a:fld id="{CA8354C6-666D-416A-8003-CE414C96EEF9}" type="datetimeFigureOut">
               <a:rPr lang="en-GB" smtClean="0"/>
-              <a:t>08/02/2014</a:t>
+              <a:t>12/02/2014</a:t>
             </a:fld>
             <a:endParaRPr lang="en-GB"/>
           </a:p>
@@ -2349,15 +2349,15 @@
         </p:nvSpPr>
         <p:spPr>
           <a:xfrm>
-            <a:off x="1058570" y="1764665"/>
-            <a:ext cx="3240405" cy="208329"/>
+            <a:off x="1344217" y="6934202"/>
+            <a:ext cx="4114800" cy="818623"/>
           </a:xfrm>
         </p:spPr>
         <p:txBody>
           <a:bodyPr anchor="b"/>
           <a:lstStyle>
             <a:lvl1pPr algn="l">
-              <a:defRPr sz="1000" b="1"/>
+              <a:defRPr sz="2100" b="1"/>
             </a:lvl1pPr>
           </a:lstStyle>
           <a:p>
@@ -2381,8 +2381,8 @@
         </p:nvSpPr>
         <p:spPr>
           <a:xfrm>
-            <a:off x="1058570" y="225252"/>
-            <a:ext cx="3240405" cy="1512570"/>
+            <a:off x="1344217" y="885121"/>
+            <a:ext cx="4114800" cy="5943600"/>
           </a:xfrm>
         </p:spPr>
         <p:txBody>
@@ -2390,39 +2390,39 @@
           <a:lstStyle>
             <a:lvl1pPr marL="0" indent="0">
               <a:buNone/>
-              <a:defRPr sz="1600"/>
+              <a:defRPr sz="3400"/>
             </a:lvl1pPr>
-            <a:lvl2pPr marL="226314" indent="0">
-              <a:buNone/>
-              <a:defRPr sz="1400"/>
+            <a:lvl2pPr marL="478926" indent="0">
+              <a:buNone/>
+              <a:defRPr sz="3000"/>
             </a:lvl2pPr>
-            <a:lvl3pPr marL="452628" indent="0">
-              <a:buNone/>
-              <a:defRPr sz="1200"/>
+            <a:lvl3pPr marL="957851" indent="0">
+              <a:buNone/>
+              <a:defRPr sz="2500"/>
             </a:lvl3pPr>
-            <a:lvl4pPr marL="678942" indent="0">
-              <a:buNone/>
-              <a:defRPr sz="1000"/>
+            <a:lvl4pPr marL="1436777" indent="0">
+              <a:buNone/>
+              <a:defRPr sz="2100"/>
             </a:lvl4pPr>
-            <a:lvl5pPr marL="905256" indent="0">
-              <a:buNone/>
-              <a:defRPr sz="1000"/>
+            <a:lvl5pPr marL="1915703" indent="0">
+              <a:buNone/>
+              <a:defRPr sz="2100"/>
             </a:lvl5pPr>
-            <a:lvl6pPr marL="1131570" indent="0">
-              <a:buNone/>
-              <a:defRPr sz="1000"/>
+            <a:lvl6pPr marL="2394628" indent="0">
+              <a:buNone/>
+              <a:defRPr sz="2100"/>
             </a:lvl6pPr>
-            <a:lvl7pPr marL="1357884" indent="0">
-              <a:buNone/>
-              <a:defRPr sz="1000"/>
+            <a:lvl7pPr marL="2873554" indent="0">
+              <a:buNone/>
+              <a:defRPr sz="2100"/>
             </a:lvl7pPr>
-            <a:lvl8pPr marL="1584198" indent="0">
-              <a:buNone/>
-              <a:defRPr sz="1000"/>
+            <a:lvl8pPr marL="3352480" indent="0">
+              <a:buNone/>
+              <a:defRPr sz="2100"/>
             </a:lvl8pPr>
-            <a:lvl9pPr marL="1810512" indent="0">
-              <a:buNone/>
-              <a:defRPr sz="1000"/>
+            <a:lvl9pPr marL="3831405" indent="0">
+              <a:buNone/>
+              <a:defRPr sz="2100"/>
             </a:lvl9pPr>
           </a:lstStyle>
           <a:p>
@@ -2442,8 +2442,8 @@
         </p:nvSpPr>
         <p:spPr>
           <a:xfrm>
-            <a:off x="1058570" y="1972994"/>
-            <a:ext cx="3240405" cy="295861"/>
+            <a:off x="1344217" y="7752825"/>
+            <a:ext cx="4114800" cy="1162577"/>
           </a:xfrm>
         </p:spPr>
         <p:txBody>
@@ -2451,39 +2451,39 @@
           <a:lstStyle>
             <a:lvl1pPr marL="0" indent="0">
               <a:buNone/>
-              <a:defRPr sz="700"/>
+              <a:defRPr sz="1500"/>
             </a:lvl1pPr>
-            <a:lvl2pPr marL="226314" indent="0">
-              <a:buNone/>
-              <a:defRPr sz="600"/>
+            <a:lvl2pPr marL="478926" indent="0">
+              <a:buNone/>
+              <a:defRPr sz="1300"/>
             </a:lvl2pPr>
-            <a:lvl3pPr marL="452628" indent="0">
-              <a:buNone/>
-              <a:defRPr sz="500"/>
+            <a:lvl3pPr marL="957851" indent="0">
+              <a:buNone/>
+              <a:defRPr sz="1100"/>
             </a:lvl3pPr>
-            <a:lvl4pPr marL="678942" indent="0">
-              <a:buNone/>
-              <a:defRPr sz="400"/>
+            <a:lvl4pPr marL="1436777" indent="0">
+              <a:buNone/>
+              <a:defRPr sz="800"/>
             </a:lvl4pPr>
-            <a:lvl5pPr marL="905256" indent="0">
-              <a:buNone/>
-              <a:defRPr sz="400"/>
+            <a:lvl5pPr marL="1915703" indent="0">
+              <a:buNone/>
+              <a:defRPr sz="800"/>
             </a:lvl5pPr>
-            <a:lvl6pPr marL="1131570" indent="0">
-              <a:buNone/>
-              <a:defRPr sz="400"/>
+            <a:lvl6pPr marL="2394628" indent="0">
+              <a:buNone/>
+              <a:defRPr sz="800"/>
             </a:lvl6pPr>
-            <a:lvl7pPr marL="1357884" indent="0">
-              <a:buNone/>
-              <a:defRPr sz="400"/>
+            <a:lvl7pPr marL="2873554" indent="0">
+              <a:buNone/>
+              <a:defRPr sz="800"/>
             </a:lvl7pPr>
-            <a:lvl8pPr marL="1584198" indent="0">
-              <a:buNone/>
-              <a:defRPr sz="400"/>
+            <a:lvl8pPr marL="3352480" indent="0">
+              <a:buNone/>
+              <a:defRPr sz="800"/>
             </a:lvl8pPr>
-            <a:lvl9pPr marL="1810512" indent="0">
-              <a:buNone/>
-              <a:defRPr sz="400"/>
+            <a:lvl9pPr marL="3831405" indent="0">
+              <a:buNone/>
+              <a:defRPr sz="800"/>
             </a:lvl9pPr>
           </a:lstStyle>
           <a:p>
@@ -2512,7 +2512,7 @@
           <a:p>
             <a:fld id="{CA8354C6-666D-416A-8003-CE414C96EEF9}" type="datetimeFigureOut">
               <a:rPr lang="en-GB" smtClean="0"/>
-              <a:t>08/02/2014</a:t>
+              <a:t>12/02/2014</a:t>
             </a:fld>
             <a:endParaRPr lang="en-GB"/>
           </a:p>
@@ -2607,15 +2607,15 @@
         </p:nvSpPr>
         <p:spPr>
           <a:xfrm>
-            <a:off x="270034" y="100955"/>
-            <a:ext cx="4860608" cy="420158"/>
+            <a:off x="342900" y="396700"/>
+            <a:ext cx="6172201" cy="1650999"/>
           </a:xfrm>
           <a:prstGeom prst="rect">
             <a:avLst/>
           </a:prstGeom>
         </p:spPr>
         <p:txBody>
-          <a:bodyPr vert="horz" lIns="45263" tIns="22631" rIns="45263" bIns="22631" rtlCol="0" anchor="ctr">
+          <a:bodyPr vert="horz" lIns="95786" tIns="47892" rIns="95786" bIns="47892" rtlCol="0" anchor="ctr">
             <a:normAutofit/>
           </a:bodyPr>
           <a:lstStyle/>
@@ -2640,15 +2640,15 @@
         </p:nvSpPr>
         <p:spPr>
           <a:xfrm>
-            <a:off x="270034" y="588222"/>
-            <a:ext cx="4860608" cy="1663710"/>
+            <a:off x="342900" y="2311401"/>
+            <a:ext cx="6172201" cy="6537500"/>
           </a:xfrm>
           <a:prstGeom prst="rect">
             <a:avLst/>
           </a:prstGeom>
         </p:spPr>
         <p:txBody>
-          <a:bodyPr vert="horz" lIns="45263" tIns="22631" rIns="45263" bIns="22631" rtlCol="0">
+          <a:bodyPr vert="horz" lIns="95786" tIns="47892" rIns="95786" bIns="47892" rtlCol="0">
             <a:normAutofit/>
           </a:bodyPr>
           <a:lstStyle/>
@@ -2702,18 +2702,18 @@
         </p:nvSpPr>
         <p:spPr>
           <a:xfrm>
-            <a:off x="270034" y="2336547"/>
-            <a:ext cx="1260158" cy="134217"/>
+            <a:off x="342900" y="9181396"/>
+            <a:ext cx="1600201" cy="527402"/>
           </a:xfrm>
           <a:prstGeom prst="rect">
             <a:avLst/>
           </a:prstGeom>
         </p:spPr>
         <p:txBody>
-          <a:bodyPr vert="horz" lIns="45263" tIns="22631" rIns="45263" bIns="22631" rtlCol="0" anchor="ctr"/>
+          <a:bodyPr vert="horz" lIns="95786" tIns="47892" rIns="95786" bIns="47892" rtlCol="0" anchor="ctr"/>
           <a:lstStyle>
             <a:lvl1pPr algn="l">
-              <a:defRPr sz="600">
+              <a:defRPr sz="1300">
                 <a:solidFill>
                   <a:schemeClr val="tx1">
                     <a:tint val="75000"/>
@@ -2725,7 +2725,7 @@
           <a:p>
             <a:fld id="{CA8354C6-666D-416A-8003-CE414C96EEF9}" type="datetimeFigureOut">
               <a:rPr lang="en-GB" smtClean="0"/>
-              <a:t>08/02/2014</a:t>
+              <a:t>12/02/2014</a:t>
             </a:fld>
             <a:endParaRPr lang="en-GB"/>
           </a:p>
@@ -2743,18 +2743,18 @@
         </p:nvSpPr>
         <p:spPr>
           <a:xfrm>
-            <a:off x="1845231" y="2336547"/>
-            <a:ext cx="1710214" cy="134217"/>
+            <a:off x="2343151" y="9181396"/>
+            <a:ext cx="2171700" cy="527402"/>
           </a:xfrm>
           <a:prstGeom prst="rect">
             <a:avLst/>
           </a:prstGeom>
         </p:spPr>
         <p:txBody>
-          <a:bodyPr vert="horz" lIns="45263" tIns="22631" rIns="45263" bIns="22631" rtlCol="0" anchor="ctr"/>
+          <a:bodyPr vert="horz" lIns="95786" tIns="47892" rIns="95786" bIns="47892" rtlCol="0" anchor="ctr"/>
           <a:lstStyle>
             <a:lvl1pPr algn="ctr">
-              <a:defRPr sz="600">
+              <a:defRPr sz="1300">
                 <a:solidFill>
                   <a:schemeClr val="tx1">
                     <a:tint val="75000"/>
@@ -2780,18 +2780,18 @@
         </p:nvSpPr>
         <p:spPr>
           <a:xfrm>
-            <a:off x="3870484" y="2336547"/>
-            <a:ext cx="1260158" cy="134217"/>
+            <a:off x="4914900" y="9181396"/>
+            <a:ext cx="1600201" cy="527402"/>
           </a:xfrm>
           <a:prstGeom prst="rect">
             <a:avLst/>
           </a:prstGeom>
         </p:spPr>
         <p:txBody>
-          <a:bodyPr vert="horz" lIns="45263" tIns="22631" rIns="45263" bIns="22631" rtlCol="0" anchor="ctr"/>
+          <a:bodyPr vert="horz" lIns="95786" tIns="47892" rIns="95786" bIns="47892" rtlCol="0" anchor="ctr"/>
           <a:lstStyle>
             <a:lvl1pPr algn="r">
-              <a:defRPr sz="600">
+              <a:defRPr sz="1300">
                 <a:solidFill>
                   <a:schemeClr val="tx1">
                     <a:tint val="75000"/>
@@ -2832,12 +2832,12 @@
   </p:sldLayoutIdLst>
   <p:txStyles>
     <p:titleStyle>
-      <a:lvl1pPr algn="ctr" defTabSz="452628" rtl="0" eaLnBrk="1" latinLnBrk="0" hangingPunct="1">
+      <a:lvl1pPr algn="ctr" defTabSz="957851" rtl="0" eaLnBrk="1" latinLnBrk="0" hangingPunct="1">
         <a:spcBef>
           <a:spcPct val="0"/>
         </a:spcBef>
         <a:buNone/>
-        <a:defRPr sz="2200" kern="1200">
+        <a:defRPr sz="4700" kern="1200">
           <a:solidFill>
             <a:schemeClr val="tx1"/>
           </a:solidFill>
@@ -2848,13 +2848,13 @@
       </a:lvl1pPr>
     </p:titleStyle>
     <p:bodyStyle>
-      <a:lvl1pPr marL="169736" indent="-169736" algn="l" defTabSz="452628" rtl="0" eaLnBrk="1" latinLnBrk="0" hangingPunct="1">
+      <a:lvl1pPr marL="359195" indent="-359195" algn="l" defTabSz="957851" rtl="0" eaLnBrk="1" latinLnBrk="0" hangingPunct="1">
         <a:spcBef>
           <a:spcPct val="20000"/>
         </a:spcBef>
         <a:buFont typeface="Arial" panose="020B0604020202020204" pitchFamily="34" charset="0"/>
         <a:buChar char="•"/>
-        <a:defRPr sz="1600" kern="1200">
+        <a:defRPr sz="3400" kern="1200">
           <a:solidFill>
             <a:schemeClr val="tx1"/>
           </a:solidFill>
@@ -2863,13 +2863,13 @@
           <a:cs typeface="+mn-cs"/>
         </a:defRPr>
       </a:lvl1pPr>
-      <a:lvl2pPr marL="367760" indent="-141446" algn="l" defTabSz="452628" rtl="0" eaLnBrk="1" latinLnBrk="0" hangingPunct="1">
+      <a:lvl2pPr marL="778254" indent="-299328" algn="l" defTabSz="957851" rtl="0" eaLnBrk="1" latinLnBrk="0" hangingPunct="1">
         <a:spcBef>
           <a:spcPct val="20000"/>
         </a:spcBef>
         <a:buFont typeface="Arial" panose="020B0604020202020204" pitchFamily="34" charset="0"/>
         <a:buChar char="–"/>
-        <a:defRPr sz="1400" kern="1200">
+        <a:defRPr sz="3000" kern="1200">
           <a:solidFill>
             <a:schemeClr val="tx1"/>
           </a:solidFill>
@@ -2878,13 +2878,13 @@
           <a:cs typeface="+mn-cs"/>
         </a:defRPr>
       </a:lvl2pPr>
-      <a:lvl3pPr marL="565785" indent="-113157" algn="l" defTabSz="452628" rtl="0" eaLnBrk="1" latinLnBrk="0" hangingPunct="1">
+      <a:lvl3pPr marL="1197314" indent="-239463" algn="l" defTabSz="957851" rtl="0" eaLnBrk="1" latinLnBrk="0" hangingPunct="1">
         <a:spcBef>
           <a:spcPct val="20000"/>
         </a:spcBef>
         <a:buFont typeface="Arial" panose="020B0604020202020204" pitchFamily="34" charset="0"/>
         <a:buChar char="•"/>
-        <a:defRPr sz="1200" kern="1200">
+        <a:defRPr sz="2500" kern="1200">
           <a:solidFill>
             <a:schemeClr val="tx1"/>
           </a:solidFill>
@@ -2893,13 +2893,13 @@
           <a:cs typeface="+mn-cs"/>
         </a:defRPr>
       </a:lvl3pPr>
-      <a:lvl4pPr marL="792099" indent="-113157" algn="l" defTabSz="452628" rtl="0" eaLnBrk="1" latinLnBrk="0" hangingPunct="1">
+      <a:lvl4pPr marL="1676240" indent="-239463" algn="l" defTabSz="957851" rtl="0" eaLnBrk="1" latinLnBrk="0" hangingPunct="1">
         <a:spcBef>
           <a:spcPct val="20000"/>
         </a:spcBef>
         <a:buFont typeface="Arial" panose="020B0604020202020204" pitchFamily="34" charset="0"/>
         <a:buChar char="–"/>
-        <a:defRPr sz="1000" kern="1200">
+        <a:defRPr sz="2100" kern="1200">
           <a:solidFill>
             <a:schemeClr val="tx1"/>
           </a:solidFill>
@@ -2908,13 +2908,13 @@
           <a:cs typeface="+mn-cs"/>
         </a:defRPr>
       </a:lvl4pPr>
-      <a:lvl5pPr marL="1018413" indent="-113157" algn="l" defTabSz="452628" rtl="0" eaLnBrk="1" latinLnBrk="0" hangingPunct="1">
+      <a:lvl5pPr marL="2155166" indent="-239463" algn="l" defTabSz="957851" rtl="0" eaLnBrk="1" latinLnBrk="0" hangingPunct="1">
         <a:spcBef>
           <a:spcPct val="20000"/>
         </a:spcBef>
         <a:buFont typeface="Arial" panose="020B0604020202020204" pitchFamily="34" charset="0"/>
         <a:buChar char="»"/>
-        <a:defRPr sz="1000" kern="1200">
+        <a:defRPr sz="2100" kern="1200">
           <a:solidFill>
             <a:schemeClr val="tx1"/>
           </a:solidFill>
@@ -2923,13 +2923,13 @@
           <a:cs typeface="+mn-cs"/>
         </a:defRPr>
       </a:lvl5pPr>
-      <a:lvl6pPr marL="1244727" indent="-113157" algn="l" defTabSz="452628" rtl="0" eaLnBrk="1" latinLnBrk="0" hangingPunct="1">
+      <a:lvl6pPr marL="2634091" indent="-239463" algn="l" defTabSz="957851" rtl="0" eaLnBrk="1" latinLnBrk="0" hangingPunct="1">
         <a:spcBef>
           <a:spcPct val="20000"/>
         </a:spcBef>
         <a:buFont typeface="Arial" panose="020B0604020202020204" pitchFamily="34" charset="0"/>
         <a:buChar char="•"/>
-        <a:defRPr sz="1000" kern="1200">
+        <a:defRPr sz="2100" kern="1200">
           <a:solidFill>
             <a:schemeClr val="tx1"/>
           </a:solidFill>
@@ -2938,13 +2938,13 @@
           <a:cs typeface="+mn-cs"/>
         </a:defRPr>
       </a:lvl6pPr>
-      <a:lvl7pPr marL="1471041" indent="-113157" algn="l" defTabSz="452628" rtl="0" eaLnBrk="1" latinLnBrk="0" hangingPunct="1">
+      <a:lvl7pPr marL="3113017" indent="-239463" algn="l" defTabSz="957851" rtl="0" eaLnBrk="1" latinLnBrk="0" hangingPunct="1">
         <a:spcBef>
           <a:spcPct val="20000"/>
         </a:spcBef>
         <a:buFont typeface="Arial" panose="020B0604020202020204" pitchFamily="34" charset="0"/>
         <a:buChar char="•"/>
-        <a:defRPr sz="1000" kern="1200">
+        <a:defRPr sz="2100" kern="1200">
           <a:solidFill>
             <a:schemeClr val="tx1"/>
           </a:solidFill>
@@ -2953,13 +2953,13 @@
           <a:cs typeface="+mn-cs"/>
         </a:defRPr>
       </a:lvl7pPr>
-      <a:lvl8pPr marL="1697355" indent="-113157" algn="l" defTabSz="452628" rtl="0" eaLnBrk="1" latinLnBrk="0" hangingPunct="1">
+      <a:lvl8pPr marL="3591943" indent="-239463" algn="l" defTabSz="957851" rtl="0" eaLnBrk="1" latinLnBrk="0" hangingPunct="1">
         <a:spcBef>
           <a:spcPct val="20000"/>
         </a:spcBef>
         <a:buFont typeface="Arial" panose="020B0604020202020204" pitchFamily="34" charset="0"/>
         <a:buChar char="•"/>
-        <a:defRPr sz="1000" kern="1200">
+        <a:defRPr sz="2100" kern="1200">
           <a:solidFill>
             <a:schemeClr val="tx1"/>
           </a:solidFill>
@@ -2968,13 +2968,13 @@
           <a:cs typeface="+mn-cs"/>
         </a:defRPr>
       </a:lvl8pPr>
-      <a:lvl9pPr marL="1923669" indent="-113157" algn="l" defTabSz="452628" rtl="0" eaLnBrk="1" latinLnBrk="0" hangingPunct="1">
+      <a:lvl9pPr marL="4070868" indent="-239463" algn="l" defTabSz="957851" rtl="0" eaLnBrk="1" latinLnBrk="0" hangingPunct="1">
         <a:spcBef>
           <a:spcPct val="20000"/>
         </a:spcBef>
         <a:buFont typeface="Arial" panose="020B0604020202020204" pitchFamily="34" charset="0"/>
         <a:buChar char="•"/>
-        <a:defRPr sz="1000" kern="1200">
+        <a:defRPr sz="2100" kern="1200">
           <a:solidFill>
             <a:schemeClr val="tx1"/>
           </a:solidFill>
@@ -2988,8 +2988,8 @@
       <a:defPPr>
         <a:defRPr lang="en-US"/>
       </a:defPPr>
-      <a:lvl1pPr marL="0" algn="l" defTabSz="452628" rtl="0" eaLnBrk="1" latinLnBrk="0" hangingPunct="1">
-        <a:defRPr sz="900" kern="1200">
+      <a:lvl1pPr marL="0" algn="l" defTabSz="957851" rtl="0" eaLnBrk="1" latinLnBrk="0" hangingPunct="1">
+        <a:defRPr sz="1900" kern="1200">
           <a:solidFill>
             <a:schemeClr val="tx1"/>
           </a:solidFill>
@@ -2998,8 +2998,8 @@
           <a:cs typeface="+mn-cs"/>
         </a:defRPr>
       </a:lvl1pPr>
-      <a:lvl2pPr marL="226314" algn="l" defTabSz="452628" rtl="0" eaLnBrk="1" latinLnBrk="0" hangingPunct="1">
-        <a:defRPr sz="900" kern="1200">
+      <a:lvl2pPr marL="478926" algn="l" defTabSz="957851" rtl="0" eaLnBrk="1" latinLnBrk="0" hangingPunct="1">
+        <a:defRPr sz="1900" kern="1200">
           <a:solidFill>
             <a:schemeClr val="tx1"/>
           </a:solidFill>
@@ -3008,8 +3008,8 @@
           <a:cs typeface="+mn-cs"/>
         </a:defRPr>
       </a:lvl2pPr>
-      <a:lvl3pPr marL="452628" algn="l" defTabSz="452628" rtl="0" eaLnBrk="1" latinLnBrk="0" hangingPunct="1">
-        <a:defRPr sz="900" kern="1200">
+      <a:lvl3pPr marL="957851" algn="l" defTabSz="957851" rtl="0" eaLnBrk="1" latinLnBrk="0" hangingPunct="1">
+        <a:defRPr sz="1900" kern="1200">
           <a:solidFill>
             <a:schemeClr val="tx1"/>
           </a:solidFill>
@@ -3018,8 +3018,8 @@
           <a:cs typeface="+mn-cs"/>
         </a:defRPr>
       </a:lvl3pPr>
-      <a:lvl4pPr marL="678942" algn="l" defTabSz="452628" rtl="0" eaLnBrk="1" latinLnBrk="0" hangingPunct="1">
-        <a:defRPr sz="900" kern="1200">
+      <a:lvl4pPr marL="1436777" algn="l" defTabSz="957851" rtl="0" eaLnBrk="1" latinLnBrk="0" hangingPunct="1">
+        <a:defRPr sz="1900" kern="1200">
           <a:solidFill>
             <a:schemeClr val="tx1"/>
           </a:solidFill>
@@ -3028,8 +3028,8 @@
           <a:cs typeface="+mn-cs"/>
         </a:defRPr>
       </a:lvl4pPr>
-      <a:lvl5pPr marL="905256" algn="l" defTabSz="452628" rtl="0" eaLnBrk="1" latinLnBrk="0" hangingPunct="1">
-        <a:defRPr sz="900" kern="1200">
+      <a:lvl5pPr marL="1915703" algn="l" defTabSz="957851" rtl="0" eaLnBrk="1" latinLnBrk="0" hangingPunct="1">
+        <a:defRPr sz="1900" kern="1200">
           <a:solidFill>
             <a:schemeClr val="tx1"/>
           </a:solidFill>
@@ -3038,8 +3038,8 @@
           <a:cs typeface="+mn-cs"/>
         </a:defRPr>
       </a:lvl5pPr>
-      <a:lvl6pPr marL="1131570" algn="l" defTabSz="452628" rtl="0" eaLnBrk="1" latinLnBrk="0" hangingPunct="1">
-        <a:defRPr sz="900" kern="1200">
+      <a:lvl6pPr marL="2394628" algn="l" defTabSz="957851" rtl="0" eaLnBrk="1" latinLnBrk="0" hangingPunct="1">
+        <a:defRPr sz="1900" kern="1200">
           <a:solidFill>
             <a:schemeClr val="tx1"/>
           </a:solidFill>
@@ -3048,8 +3048,8 @@
           <a:cs typeface="+mn-cs"/>
         </a:defRPr>
       </a:lvl6pPr>
-      <a:lvl7pPr marL="1357884" algn="l" defTabSz="452628" rtl="0" eaLnBrk="1" latinLnBrk="0" hangingPunct="1">
-        <a:defRPr sz="900" kern="1200">
+      <a:lvl7pPr marL="2873554" algn="l" defTabSz="957851" rtl="0" eaLnBrk="1" latinLnBrk="0" hangingPunct="1">
+        <a:defRPr sz="1900" kern="1200">
           <a:solidFill>
             <a:schemeClr val="tx1"/>
           </a:solidFill>
@@ -3058,8 +3058,8 @@
           <a:cs typeface="+mn-cs"/>
         </a:defRPr>
       </a:lvl7pPr>
-      <a:lvl8pPr marL="1584198" algn="l" defTabSz="452628" rtl="0" eaLnBrk="1" latinLnBrk="0" hangingPunct="1">
-        <a:defRPr sz="900" kern="1200">
+      <a:lvl8pPr marL="3352480" algn="l" defTabSz="957851" rtl="0" eaLnBrk="1" latinLnBrk="0" hangingPunct="1">
+        <a:defRPr sz="1900" kern="1200">
           <a:solidFill>
             <a:schemeClr val="tx1"/>
           </a:solidFill>
@@ -3068,8 +3068,8 @@
           <a:cs typeface="+mn-cs"/>
         </a:defRPr>
       </a:lvl8pPr>
-      <a:lvl9pPr marL="1810512" algn="l" defTabSz="452628" rtl="0" eaLnBrk="1" latinLnBrk="0" hangingPunct="1">
-        <a:defRPr sz="900" kern="1200">
+      <a:lvl9pPr marL="3831405" algn="l" defTabSz="957851" rtl="0" eaLnBrk="1" latinLnBrk="0" hangingPunct="1">
+        <a:defRPr sz="1900" kern="1200">
           <a:solidFill>
             <a:schemeClr val="tx1"/>
           </a:solidFill>
@@ -3100,95 +3100,112 @@
           <a:chExt cx="0" cy="0"/>
         </a:xfrm>
       </p:grpSpPr>
-      <p:pic>
-        <p:nvPicPr>
-          <p:cNvPr id="5" name="Picture 2" descr="http://www.technovelgy.com/graphics/content07/Festo-Airics-arm-NS5.jpg"/>
-          <p:cNvPicPr>
-            <a:picLocks noChangeAspect="1" noChangeArrowheads="1"/>
-          </p:cNvPicPr>
+      <p:grpSp>
+        <p:nvGrpSpPr>
+          <p:cNvPr id="2" name="Group 1"/>
+          <p:cNvGrpSpPr>
+            <a:grpSpLocks noChangeAspect="1"/>
+          </p:cNvGrpSpPr>
           <p:nvPr/>
-        </p:nvPicPr>
-        <p:blipFill>
-          <a:blip r:embed="rId2">
+        </p:nvGrpSpPr>
+        <p:grpSpPr>
+          <a:xfrm>
+            <a:off x="116637" y="77941"/>
+            <a:ext cx="1800000" cy="849580"/>
+            <a:chOff x="116637" y="77941"/>
+            <a:chExt cx="5175988" cy="2443009"/>
+          </a:xfrm>
+        </p:grpSpPr>
+        <p:pic>
+          <p:nvPicPr>
+            <p:cNvPr id="6" name="Picture 2" descr="http://www.technovelgy.com/graphics/content07/Festo-Airics-arm-NS5.jpg"/>
+            <p:cNvPicPr>
+              <a:picLocks noChangeAspect="1" noChangeArrowheads="1"/>
+            </p:cNvPicPr>
+            <p:nvPr/>
+          </p:nvPicPr>
+          <p:blipFill>
+            <a:blip r:embed="rId2" cstate="print">
+              <a:extLst>
+                <a:ext uri="{28A0092B-C50C-407E-A947-70E740481C1C}">
+                  <a14:useLocalDpi xmlns:a14="http://schemas.microsoft.com/office/drawing/2010/main" val="0"/>
+                </a:ext>
+              </a:extLst>
+            </a:blip>
+            <a:srcRect/>
+            <a:stretch>
+              <a:fillRect/>
+            </a:stretch>
+          </p:blipFill>
+          <p:spPr bwMode="auto">
+            <a:xfrm>
+              <a:off x="116637" y="77941"/>
+              <a:ext cx="1431572" cy="2443009"/>
+            </a:xfrm>
+            <a:prstGeom prst="rect">
+              <a:avLst/>
+            </a:prstGeom>
+            <a:noFill/>
             <a:extLst>
-              <a:ext uri="{28A0092B-C50C-407E-A947-70E740481C1C}">
-                <a14:useLocalDpi xmlns:a14="http://schemas.microsoft.com/office/drawing/2010/main" val="0"/>
+              <a:ext uri="{909E8E84-426E-40DD-AFC4-6F175D3DCCD1}">
+                <a14:hiddenFill xmlns:a14="http://schemas.microsoft.com/office/drawing/2010/main">
+                  <a:solidFill>
+                    <a:srgbClr val="FFFFFF"/>
+                  </a:solidFill>
+                </a14:hiddenFill>
               </a:ext>
             </a:extLst>
-          </a:blip>
-          <a:srcRect/>
-          <a:stretch>
-            <a:fillRect/>
-          </a:stretch>
-        </p:blipFill>
-        <p:spPr bwMode="auto">
-          <a:xfrm>
-            <a:off x="116637" y="77941"/>
-            <a:ext cx="1431572" cy="2443009"/>
-          </a:xfrm>
-          <a:prstGeom prst="rect">
-            <a:avLst/>
-          </a:prstGeom>
-          <a:noFill/>
-          <a:extLst>
-            <a:ext uri="{909E8E84-426E-40DD-AFC4-6F175D3DCCD1}">
-              <a14:hiddenFill xmlns:a14="http://schemas.microsoft.com/office/drawing/2010/main">
-                <a:solidFill>
-                  <a:srgbClr val="FFFFFF"/>
-                </a:solidFill>
-              </a14:hiddenFill>
-            </a:ext>
-          </a:extLst>
-        </p:spPr>
-      </p:pic>
-      <p:sp>
-        <p:nvSpPr>
-          <p:cNvPr id="4" name="TextBox 3"/>
-          <p:cNvSpPr txBox="1"/>
-          <p:nvPr/>
-        </p:nvSpPr>
-        <p:spPr>
-          <a:xfrm>
-            <a:off x="1836241" y="324371"/>
-            <a:ext cx="3456384" cy="1877437"/>
-          </a:xfrm>
-          <a:prstGeom prst="rect">
-            <a:avLst/>
-          </a:prstGeom>
-          <a:noFill/>
-        </p:spPr>
-        <p:txBody>
-          <a:bodyPr wrap="square" rtlCol="0">
-            <a:spAutoFit/>
-          </a:bodyPr>
-          <a:lstStyle/>
-          <a:p>
-            <a:r>
-              <a:rPr lang="en-GB" sz="2800" dirty="0">
+          </p:spPr>
+        </p:pic>
+        <p:sp>
+          <p:nvSpPr>
+            <p:cNvPr id="7" name="TextBox 6"/>
+            <p:cNvSpPr txBox="1"/>
+            <p:nvPr/>
+          </p:nvSpPr>
+          <p:spPr>
+            <a:xfrm>
+              <a:off x="1836241" y="324370"/>
+              <a:ext cx="3456384" cy="2079814"/>
+            </a:xfrm>
+            <a:prstGeom prst="rect">
+              <a:avLst/>
+            </a:prstGeom>
+            <a:noFill/>
+          </p:spPr>
+          <p:txBody>
+            <a:bodyPr wrap="square" rtlCol="0">
+              <a:spAutoFit/>
+            </a:bodyPr>
+            <a:lstStyle/>
+            <a:p>
+              <a:r>
+                <a:rPr lang="en-GB" sz="900" dirty="0">
+                  <a:latin typeface="Berlin Sans FB" panose="020E0602020502020306" pitchFamily="34" charset="0"/>
+                </a:rPr>
+                <a:t>m</a:t>
+              </a:r>
+              <a:r>
+                <a:rPr lang="en-GB" sz="900" dirty="0" smtClean="0">
+                  <a:latin typeface="Berlin Sans FB" panose="020E0602020502020306" pitchFamily="34" charset="0"/>
+                </a:rPr>
+                <a:t>y other robot is an</a:t>
+              </a:r>
+            </a:p>
+            <a:p>
+              <a:r>
+                <a:rPr lang="en-GB" sz="3200" dirty="0" smtClean="0">
+                  <a:latin typeface="Berlin Sans FB" panose="020E0602020502020306" pitchFamily="34" charset="0"/>
+                </a:rPr>
+                <a:t>NS-5</a:t>
+              </a:r>
+              <a:endParaRPr lang="en-GB" sz="3200" dirty="0">
                 <a:latin typeface="Berlin Sans FB" panose="020E0602020502020306" pitchFamily="34" charset="0"/>
-              </a:rPr>
-              <a:t>m</a:t>
-            </a:r>
-            <a:r>
-              <a:rPr lang="en-GB" sz="2800" dirty="0" smtClean="0">
-                <a:latin typeface="Berlin Sans FB" panose="020E0602020502020306" pitchFamily="34" charset="0"/>
-              </a:rPr>
-              <a:t>y other robot is an</a:t>
-            </a:r>
-          </a:p>
-          <a:p>
-            <a:r>
-              <a:rPr lang="en-GB" sz="8800" dirty="0" smtClean="0">
-                <a:latin typeface="Berlin Sans FB" panose="020E0602020502020306" pitchFamily="34" charset="0"/>
-              </a:rPr>
-              <a:t>NS-5</a:t>
-            </a:r>
-            <a:endParaRPr lang="en-GB" sz="8800" dirty="0">
-              <a:latin typeface="Berlin Sans FB" panose="020E0602020502020306" pitchFamily="34" charset="0"/>
-            </a:endParaRPr>
-          </a:p>
-        </p:txBody>
-      </p:sp>
+              </a:endParaRPr>
+            </a:p>
+          </p:txBody>
+        </p:sp>
+      </p:grpSp>
     </p:spTree>
     <p:extLst>
       <p:ext uri="{BB962C8B-B14F-4D97-AF65-F5344CB8AC3E}">

</xml_diff>